<commit_message>
Updated from Booz Computer
</commit_message>
<xml_diff>
--- a/Building Web Applications with shiny v2.pptx
+++ b/Building Web Applications with shiny v2.pptx
@@ -45,26 +45,26 @@
   <p:notesSz cx="6959600" cy="9245600"/>
   <p:embeddedFontLst>
     <p:embeddedFont>
-      <p:font typeface="Lato" panose="020F0502020204030203" pitchFamily="34" charset="0"/>
+      <p:font typeface="Webdings" panose="05030102010509060703" pitchFamily="18" charset="2"/>
       <p:regular r:id="rId33"/>
-      <p:bold r:id="rId34"/>
-      <p:italic r:id="rId35"/>
-      <p:boldItalic r:id="rId36"/>
-    </p:embeddedFont>
-    <p:embeddedFont>
-      <p:font typeface="Webdings" panose="05030102010509060703" pitchFamily="18" charset="2"/>
-      <p:regular r:id="rId37"/>
     </p:embeddedFont>
     <p:embeddedFont>
       <p:font typeface="Consolas" panose="020B0609020204030204" pitchFamily="49" charset="0"/>
-      <p:regular r:id="rId38"/>
-      <p:bold r:id="rId39"/>
-      <p:italic r:id="rId40"/>
-      <p:boldItalic r:id="rId41"/>
+      <p:regular r:id="rId34"/>
+      <p:bold r:id="rId35"/>
+      <p:italic r:id="rId36"/>
+      <p:boldItalic r:id="rId37"/>
     </p:embeddedFont>
     <p:embeddedFont>
-      <p:font typeface="Lato Black" panose="020F0A02020204030203" pitchFamily="34" charset="0"/>
-      <p:bold r:id="rId42"/>
+      <p:font typeface="Lato Black" panose="020B0604020202020204" charset="0"/>
+      <p:bold r:id="rId38"/>
+      <p:boldItalic r:id="rId39"/>
+    </p:embeddedFont>
+    <p:embeddedFont>
+      <p:font typeface="Lato" panose="020B0604020202020204" charset="0"/>
+      <p:regular r:id="rId40"/>
+      <p:bold r:id="rId41"/>
+      <p:italic r:id="rId42"/>
       <p:boldItalic r:id="rId43"/>
     </p:embeddedFont>
   </p:embeddedFontLst>
@@ -4929,23 +4929,8 @@
               <a:rPr lang="en-US" sz="2000" i="1" dirty="0" smtClean="0">
                 <a:latin typeface="Lato Black" panose="020F0A02020204030203" pitchFamily="34" charset="0"/>
               </a:rPr>
-              <a:t>Building Web Applications with </a:t>
-            </a:r>
-            <a:r>
-              <a:rPr lang="en-US" sz="2000" i="1" dirty="0" smtClean="0">
-                <a:latin typeface="Lato Black" panose="020F0A02020204030203" pitchFamily="34" charset="0"/>
-              </a:rPr>
-              <a:t>R and </a:t>
-            </a:r>
-            <a:r>
-              <a:rPr lang="en-US" sz="2000" i="1" dirty="0" smtClean="0">
-                <a:latin typeface="Lato Black" panose="020F0A02020204030203" pitchFamily="34" charset="0"/>
-              </a:rPr>
-              <a:t>Shiny</a:t>
-            </a:r>
-            <a:endParaRPr lang="en-US" sz="2000" i="1" dirty="0" smtClean="0">
-              <a:latin typeface="Lato Black" panose="020F0A02020204030203" pitchFamily="34" charset="0"/>
-            </a:endParaRPr>
+              <a:t>Building Web Applications with R and Shiny</a:t>
+            </a:r>
           </a:p>
         </p:txBody>
       </p:sp>
@@ -6285,11 +6270,7 @@
             </a:pPr>
             <a:r>
               <a:rPr lang="en-US" dirty="0" smtClean="0"/>
-              <a:t>The desired </a:t>
-            </a:r>
-            <a:r>
-              <a:rPr lang="en-US" dirty="0" smtClean="0"/>
-              <a:t>output has to be passed through one of a series of </a:t>
+              <a:t>The desired output has to be passed through one of a series of </a:t>
             </a:r>
             <a:r>
               <a:rPr lang="en-US" b="1" dirty="0" smtClean="0"/>
@@ -6297,15 +6278,7 @@
             </a:r>
             <a:r>
               <a:rPr lang="en-US" dirty="0" smtClean="0"/>
-              <a:t>. </a:t>
-            </a:r>
-            <a:r>
-              <a:rPr lang="en-US" dirty="0" smtClean="0"/>
-              <a:t>The </a:t>
-            </a:r>
-            <a:r>
-              <a:rPr lang="en-US" dirty="0" smtClean="0"/>
-              <a:t>results of this render function are then passed to a list, called output, where the components are the outputs and the names of the components are unique names assigned in the </a:t>
+              <a:t>. The results of this render function are then passed to a list, called output, where the components are the outputs and the names of the components are unique names assigned in the </a:t>
             </a:r>
             <a:r>
               <a:rPr lang="en-US" dirty="0" err="1" smtClean="0"/>
@@ -6323,19 +6296,7 @@
             </a:pPr>
             <a:r>
               <a:rPr lang="en-US" dirty="0" smtClean="0"/>
-              <a:t>Each rendered </a:t>
-            </a:r>
-            <a:r>
-              <a:rPr lang="en-US" dirty="0" smtClean="0"/>
-              <a:t>output needs dedicated space in the user </a:t>
-            </a:r>
-            <a:r>
-              <a:rPr lang="en-US" dirty="0" smtClean="0"/>
-              <a:t>interface. </a:t>
-            </a:r>
-            <a:r>
-              <a:rPr lang="en-US" dirty="0" smtClean="0"/>
-              <a:t>This is done by placing an </a:t>
+              <a:t>Each rendered output needs dedicated space in the user interface. This is done by placing an </a:t>
             </a:r>
             <a:r>
               <a:rPr lang="en-US" b="1" dirty="0" smtClean="0"/>
@@ -6359,11 +6320,7 @@
             </a:r>
             <a:r>
               <a:rPr lang="en-US" dirty="0" smtClean="0"/>
-              <a:t> file</a:t>
-            </a:r>
-            <a:r>
-              <a:rPr lang="en-US" dirty="0" smtClean="0"/>
-              <a:t>.</a:t>
+              <a:t> file.</a:t>
             </a:r>
           </a:p>
           <a:p>
@@ -6372,7 +6329,6 @@
               <a:rPr lang="en-US" dirty="0" smtClean="0"/>
               <a:t>Each render function has an accompanying output function…</a:t>
             </a:r>
-            <a:endParaRPr lang="en-US" dirty="0" smtClean="0"/>
           </a:p>
           <a:p>
             <a:pPr lvl="1"/>
@@ -7052,13 +7008,7 @@
               <a:rPr lang="en-US" sz="1400" dirty="0" smtClean="0">
                 <a:latin typeface="Lato" panose="020F0502020204030203" pitchFamily="34" charset="0"/>
               </a:rPr>
-              <a:t>That last render and output function are used for creating reactive UI </a:t>
-            </a:r>
-            <a:r>
-              <a:rPr lang="en-US" sz="1400" dirty="0" smtClean="0">
-                <a:latin typeface="Lato" panose="020F0502020204030203" pitchFamily="34" charset="0"/>
-              </a:rPr>
-              <a:t>elements </a:t>
+              <a:t>That last render and output function are used for creating reactive UI elements </a:t>
             </a:r>
             <a:r>
               <a:rPr lang="en-US" sz="1400" i="1" dirty="0" smtClean="0">

</xml_diff>